<commit_message>
class04: fix the picture about disk areas affected by "create a file".
</commit_message>
<xml_diff>
--- a/talks/src/class04.pptx
+++ b/talks/src/class04.pptx
@@ -246,7 +246,7 @@
           <a:p>
             <a:fld id="{56C6788E-680A-49E5-BB93-D456A9D23A29}" type="datetimeFigureOut">
               <a:rPr lang="ru-RU" smtClean="0"/>
-              <a:t>04.11.2024</a:t>
+              <a:t>14.11.2025</a:t>
             </a:fld>
             <a:endParaRPr lang="ru-RU"/>
           </a:p>
@@ -415,7 +415,7 @@
           <a:p>
             <a:fld id="{C4DF4945-C160-4CD5-B124-49B9BE14C0AB}" type="datetimeFigureOut">
               <a:rPr lang="ru-RU" smtClean="0"/>
-              <a:t>04.11.2024</a:t>
+              <a:t>13.11.2025</a:t>
             </a:fld>
             <a:endParaRPr lang="ru-RU"/>
           </a:p>
@@ -5883,7 +5883,7 @@
           <a:p>
             <a:fld id="{12C63722-5D9F-4E99-9720-9B6A0C7BB1C9}" type="datetimeFigureOut">
               <a:rPr lang="ru-RU" smtClean="0"/>
-              <a:t>04.11.2024</a:t>
+              <a:t>13.11.2025</a:t>
             </a:fld>
             <a:endParaRPr lang="ru-RU"/>
           </a:p>
@@ -6053,7 +6053,7 @@
           <a:p>
             <a:fld id="{12C63722-5D9F-4E99-9720-9B6A0C7BB1C9}" type="datetimeFigureOut">
               <a:rPr lang="ru-RU" smtClean="0"/>
-              <a:t>04.11.2024</a:t>
+              <a:t>13.11.2025</a:t>
             </a:fld>
             <a:endParaRPr lang="ru-RU"/>
           </a:p>
@@ -6233,7 +6233,7 @@
           <a:p>
             <a:fld id="{12C63722-5D9F-4E99-9720-9B6A0C7BB1C9}" type="datetimeFigureOut">
               <a:rPr lang="ru-RU" smtClean="0"/>
-              <a:t>04.11.2024</a:t>
+              <a:t>13.11.2025</a:t>
             </a:fld>
             <a:endParaRPr lang="ru-RU"/>
           </a:p>
@@ -6425,7 +6425,7 @@
           <a:p>
             <a:fld id="{8C218C88-2408-4CFC-B25C-07450930B282}" type="datetimeFigureOut">
               <a:rPr lang="ru-RU" smtClean="0"/>
-              <a:t>04.11.2024</a:t>
+              <a:t>13.11.2025</a:t>
             </a:fld>
             <a:endParaRPr lang="ru-RU"/>
           </a:p>
@@ -6595,7 +6595,7 @@
           <a:p>
             <a:fld id="{8C218C88-2408-4CFC-B25C-07450930B282}" type="datetimeFigureOut">
               <a:rPr lang="ru-RU" smtClean="0"/>
-              <a:t>04.11.2024</a:t>
+              <a:t>13.11.2025</a:t>
             </a:fld>
             <a:endParaRPr lang="ru-RU"/>
           </a:p>
@@ -6841,7 +6841,7 @@
           <a:p>
             <a:fld id="{8C218C88-2408-4CFC-B25C-07450930B282}" type="datetimeFigureOut">
               <a:rPr lang="ru-RU" smtClean="0"/>
-              <a:t>04.11.2024</a:t>
+              <a:t>13.11.2025</a:t>
             </a:fld>
             <a:endParaRPr lang="ru-RU"/>
           </a:p>
@@ -7073,7 +7073,7 @@
           <a:p>
             <a:fld id="{8C218C88-2408-4CFC-B25C-07450930B282}" type="datetimeFigureOut">
               <a:rPr lang="ru-RU" smtClean="0"/>
-              <a:t>04.11.2024</a:t>
+              <a:t>13.11.2025</a:t>
             </a:fld>
             <a:endParaRPr lang="ru-RU"/>
           </a:p>
@@ -7440,7 +7440,7 @@
           <a:p>
             <a:fld id="{8C218C88-2408-4CFC-B25C-07450930B282}" type="datetimeFigureOut">
               <a:rPr lang="ru-RU" smtClean="0"/>
-              <a:t>04.11.2024</a:t>
+              <a:t>13.11.2025</a:t>
             </a:fld>
             <a:endParaRPr lang="ru-RU"/>
           </a:p>
@@ -7558,7 +7558,7 @@
           <a:p>
             <a:fld id="{8C218C88-2408-4CFC-B25C-07450930B282}" type="datetimeFigureOut">
               <a:rPr lang="ru-RU" smtClean="0"/>
-              <a:t>04.11.2024</a:t>
+              <a:t>13.11.2025</a:t>
             </a:fld>
             <a:endParaRPr lang="ru-RU"/>
           </a:p>
@@ -7653,7 +7653,7 @@
           <a:p>
             <a:fld id="{8C218C88-2408-4CFC-B25C-07450930B282}" type="datetimeFigureOut">
               <a:rPr lang="ru-RU" smtClean="0"/>
-              <a:t>04.11.2024</a:t>
+              <a:t>13.11.2025</a:t>
             </a:fld>
             <a:endParaRPr lang="ru-RU"/>
           </a:p>
@@ -7930,7 +7930,7 @@
           <a:p>
             <a:fld id="{8C218C88-2408-4CFC-B25C-07450930B282}" type="datetimeFigureOut">
               <a:rPr lang="ru-RU" smtClean="0"/>
-              <a:t>04.11.2024</a:t>
+              <a:t>13.11.2025</a:t>
             </a:fld>
             <a:endParaRPr lang="ru-RU"/>
           </a:p>
@@ -8100,7 +8100,7 @@
           <a:p>
             <a:fld id="{12C63722-5D9F-4E99-9720-9B6A0C7BB1C9}" type="datetimeFigureOut">
               <a:rPr lang="ru-RU" smtClean="0"/>
-              <a:t>04.11.2024</a:t>
+              <a:t>13.11.2025</a:t>
             </a:fld>
             <a:endParaRPr lang="ru-RU"/>
           </a:p>
@@ -8353,7 +8353,7 @@
           <a:p>
             <a:fld id="{8C218C88-2408-4CFC-B25C-07450930B282}" type="datetimeFigureOut">
               <a:rPr lang="ru-RU" smtClean="0"/>
-              <a:t>04.11.2024</a:t>
+              <a:t>13.11.2025</a:t>
             </a:fld>
             <a:endParaRPr lang="ru-RU"/>
           </a:p>
@@ -8523,7 +8523,7 @@
           <a:p>
             <a:fld id="{8C218C88-2408-4CFC-B25C-07450930B282}" type="datetimeFigureOut">
               <a:rPr lang="ru-RU" smtClean="0"/>
-              <a:t>04.11.2024</a:t>
+              <a:t>13.11.2025</a:t>
             </a:fld>
             <a:endParaRPr lang="ru-RU"/>
           </a:p>
@@ -8703,7 +8703,7 @@
           <a:p>
             <a:fld id="{8C218C88-2408-4CFC-B25C-07450930B282}" type="datetimeFigureOut">
               <a:rPr lang="ru-RU" smtClean="0"/>
-              <a:t>04.11.2024</a:t>
+              <a:t>13.11.2025</a:t>
             </a:fld>
             <a:endParaRPr lang="ru-RU"/>
           </a:p>
@@ -8949,7 +8949,7 @@
           <a:p>
             <a:fld id="{12C63722-5D9F-4E99-9720-9B6A0C7BB1C9}" type="datetimeFigureOut">
               <a:rPr lang="ru-RU" smtClean="0"/>
-              <a:t>04.11.2024</a:t>
+              <a:t>13.11.2025</a:t>
             </a:fld>
             <a:endParaRPr lang="ru-RU"/>
           </a:p>
@@ -9189,7 +9189,7 @@
           <a:p>
             <a:fld id="{12C63722-5D9F-4E99-9720-9B6A0C7BB1C9}" type="datetimeFigureOut">
               <a:rPr lang="ru-RU" smtClean="0"/>
-              <a:t>04.11.2024</a:t>
+              <a:t>13.11.2025</a:t>
             </a:fld>
             <a:endParaRPr lang="ru-RU"/>
           </a:p>
@@ -9556,7 +9556,7 @@
           <a:p>
             <a:fld id="{12C63722-5D9F-4E99-9720-9B6A0C7BB1C9}" type="datetimeFigureOut">
               <a:rPr lang="ru-RU" smtClean="0"/>
-              <a:t>04.11.2024</a:t>
+              <a:t>13.11.2025</a:t>
             </a:fld>
             <a:endParaRPr lang="ru-RU"/>
           </a:p>
@@ -9674,7 +9674,7 @@
           <a:p>
             <a:fld id="{12C63722-5D9F-4E99-9720-9B6A0C7BB1C9}" type="datetimeFigureOut">
               <a:rPr lang="ru-RU" smtClean="0"/>
-              <a:t>04.11.2024</a:t>
+              <a:t>13.11.2025</a:t>
             </a:fld>
             <a:endParaRPr lang="ru-RU"/>
           </a:p>
@@ -9769,7 +9769,7 @@
           <a:p>
             <a:fld id="{12C63722-5D9F-4E99-9720-9B6A0C7BB1C9}" type="datetimeFigureOut">
               <a:rPr lang="ru-RU" smtClean="0"/>
-              <a:t>04.11.2024</a:t>
+              <a:t>13.11.2025</a:t>
             </a:fld>
             <a:endParaRPr lang="ru-RU"/>
           </a:p>
@@ -10046,7 +10046,7 @@
           <a:p>
             <a:fld id="{12C63722-5D9F-4E99-9720-9B6A0C7BB1C9}" type="datetimeFigureOut">
               <a:rPr lang="ru-RU" smtClean="0"/>
-              <a:t>04.11.2024</a:t>
+              <a:t>13.11.2025</a:t>
             </a:fld>
             <a:endParaRPr lang="ru-RU"/>
           </a:p>
@@ -10299,7 +10299,7 @@
           <a:p>
             <a:fld id="{12C63722-5D9F-4E99-9720-9B6A0C7BB1C9}" type="datetimeFigureOut">
               <a:rPr lang="ru-RU" smtClean="0"/>
-              <a:t>04.11.2024</a:t>
+              <a:t>13.11.2025</a:t>
             </a:fld>
             <a:endParaRPr lang="ru-RU"/>
           </a:p>
@@ -10512,7 +10512,7 @@
           <a:p>
             <a:fld id="{12C63722-5D9F-4E99-9720-9B6A0C7BB1C9}" type="datetimeFigureOut">
               <a:rPr lang="ru-RU" smtClean="0"/>
-              <a:t>04.11.2024</a:t>
+              <a:t>13.11.2025</a:t>
             </a:fld>
             <a:endParaRPr lang="ru-RU"/>
           </a:p>
@@ -11052,7 +11052,7 @@
           <a:p>
             <a:fld id="{8C218C88-2408-4CFC-B25C-07450930B282}" type="datetimeFigureOut">
               <a:rPr lang="ru-RU" smtClean="0"/>
-              <a:t>04.11.2024</a:t>
+              <a:t>13.11.2025</a:t>
             </a:fld>
             <a:endParaRPr lang="ru-RU"/>
           </a:p>
@@ -21239,14 +21239,14 @@
           <p:nvPr>
             <p:extLst>
               <p:ext uri="{D42A27DB-BD31-4B8C-83A1-F6EECF244321}">
-                <p14:modId xmlns:p14="http://schemas.microsoft.com/office/powerpoint/2010/main" val="2657330373"/>
+                <p14:modId xmlns:p14="http://schemas.microsoft.com/office/powerpoint/2010/main" val="2055855249"/>
               </p:ext>
             </p:extLst>
           </p:nvPr>
         </p:nvGraphicFramePr>
         <p:xfrm>
           <a:off x="0" y="365762"/>
-          <a:ext cx="12192000" cy="4937760"/>
+          <a:ext cx="12192000" cy="5212080"/>
         </p:xfrm>
         <a:graphic>
           <a:graphicData uri="http://schemas.openxmlformats.org/drawingml/2006/table">
@@ -21645,7 +21645,7 @@
                       </a:r>
                       <a:r>
                         <a:rPr lang="en-US" baseline="0" dirty="0"/>
-                        <a:t> their storage into data and metadata files.</a:t>
+                        <a:t> their storage into data and metadata files, and replacing metadata files atomically after a change to the data is persisted.</a:t>
                       </a:r>
                     </a:p>
                     <a:p>
@@ -21850,7 +21850,7 @@
           <p:nvPr>
             <p:extLst>
               <p:ext uri="{D42A27DB-BD31-4B8C-83A1-F6EECF244321}">
-                <p14:modId xmlns:p14="http://schemas.microsoft.com/office/powerpoint/2010/main" val="121758453"/>
+                <p14:modId xmlns:p14="http://schemas.microsoft.com/office/powerpoint/2010/main" val="594950911"/>
               </p:ext>
             </p:extLst>
           </p:nvPr>
@@ -21903,7 +21903,7 @@
                     <a:p>
                       <a:r>
                         <a:rPr lang="en-US" dirty="0"/>
-                        <a:t>A journal can have a limited number of entries. It needs to be cleared regularly</a:t>
+                        <a:t>A journal has a limited number of entries. It needs to be cleared regularly</a:t>
                       </a:r>
                       <a:r>
                         <a:rPr lang="ru-RU" baseline="0" dirty="0"/>
@@ -25392,7 +25392,7 @@
           <p:nvPr>
             <p:extLst>
               <p:ext uri="{D42A27DB-BD31-4B8C-83A1-F6EECF244321}">
-                <p14:modId xmlns:p14="http://schemas.microsoft.com/office/powerpoint/2010/main" val="9715106"/>
+                <p14:modId xmlns:p14="http://schemas.microsoft.com/office/powerpoint/2010/main" val="2279239206"/>
               </p:ext>
             </p:extLst>
           </p:nvPr>
@@ -25615,7 +25615,7 @@
                       </a:pPr>
                       <a:r>
                         <a:rPr lang="en-US" dirty="0"/>
-                        <a:t>In general transactions can’t be replayed twice:</a:t>
+                        <a:t>In general, transactions can’t be replayed twice:</a:t>
                       </a:r>
                       <a:br>
                         <a:rPr lang="en-US" dirty="0"/>
@@ -26795,7 +26795,7 @@
           <p:nvPr>
             <p:extLst>
               <p:ext uri="{D42A27DB-BD31-4B8C-83A1-F6EECF244321}">
-                <p14:modId xmlns:p14="http://schemas.microsoft.com/office/powerpoint/2010/main" val="1512861685"/>
+                <p14:modId xmlns:p14="http://schemas.microsoft.com/office/powerpoint/2010/main" val="2134823193"/>
               </p:ext>
             </p:extLst>
           </p:nvPr>
@@ -27249,7 +27249,7 @@
                           <a:latin typeface="+mn-lt"/>
                           <a:cs typeface="Consolas" panose="020B0609020204030204" pitchFamily="49" charset="0"/>
                         </a:rPr>
-                        <a:t> is a random string generated by client. If EC2 receives two requests with the same </a:t>
+                        <a:t> is a random string generated by the client. If EC2 receives two requests with the same </a:t>
                       </a:r>
                       <a:r>
                         <a:rPr lang="en-US" sz="1800" dirty="0" err="1">
@@ -27263,7 +27263,7 @@
                           <a:latin typeface="+mn-lt"/>
                           <a:cs typeface="Consolas" panose="020B0609020204030204" pitchFamily="49" charset="0"/>
                         </a:rPr>
-                        <a:t>, then it knows that the second one is a retry. It does not create a second VM, but returns the result of the first call.</a:t>
+                        <a:t>, it knows that the second one is a retry. It does not create a second VM, but returns the result of the first call.</a:t>
                       </a:r>
                     </a:p>
                   </a:txBody>
@@ -29858,7 +29858,7 @@
           <p:nvPr>
             <p:extLst>
               <p:ext uri="{D42A27DB-BD31-4B8C-83A1-F6EECF244321}">
-                <p14:modId xmlns:p14="http://schemas.microsoft.com/office/powerpoint/2010/main" val="4074212216"/>
+                <p14:modId xmlns:p14="http://schemas.microsoft.com/office/powerpoint/2010/main" val="3804585599"/>
               </p:ext>
             </p:extLst>
           </p:nvPr>
@@ -29974,7 +29974,7 @@
                       </a:pPr>
                       <a:r>
                         <a:rPr lang="en-US" dirty="0"/>
-                        <a:t>become corrupted and return IO errors until is overwritten.</a:t>
+                        <a:t>become corrupted and return IO errors until it is overwritten.</a:t>
                       </a:r>
                       <a:endParaRPr lang="ru-RU" dirty="0"/>
                     </a:p>
@@ -31086,7 +31086,7 @@
           <p:nvPr>
             <p:extLst>
               <p:ext uri="{D42A27DB-BD31-4B8C-83A1-F6EECF244321}">
-                <p14:modId xmlns:p14="http://schemas.microsoft.com/office/powerpoint/2010/main" val="1340382488"/>
+                <p14:modId xmlns:p14="http://schemas.microsoft.com/office/powerpoint/2010/main" val="1991973553"/>
               </p:ext>
             </p:extLst>
           </p:nvPr>
@@ -31201,31 +31201,33 @@
                     </a:p>
                   </a:txBody>
                   <a:tcPr>
+                    <a:noFill/>
+                  </a:tcPr>
+                </a:tc>
+                <a:tc>
+                  <a:txBody>
+                    <a:bodyPr/>
+                    <a:lstStyle/>
+                    <a:p>
+                      <a:r>
+                        <a:rPr lang="en-US" dirty="0" err="1"/>
+                        <a:t>Inode</a:t>
+                      </a:r>
+                      <a:br>
+                        <a:rPr lang="en-US" dirty="0"/>
+                      </a:br>
+                      <a:r>
+                        <a:rPr lang="en-US" dirty="0"/>
+                        <a:t>bitmap</a:t>
+                      </a:r>
+                      <a:endParaRPr lang="ru-RU" dirty="0"/>
+                    </a:p>
+                  </a:txBody>
+                  <a:tcPr>
                     <a:solidFill>
                       <a:srgbClr val="00B050"/>
                     </a:solidFill>
                   </a:tcPr>
-                </a:tc>
-                <a:tc>
-                  <a:txBody>
-                    <a:bodyPr/>
-                    <a:lstStyle/>
-                    <a:p>
-                      <a:r>
-                        <a:rPr lang="en-US" dirty="0" err="1"/>
-                        <a:t>Inode</a:t>
-                      </a:r>
-                      <a:br>
-                        <a:rPr lang="en-US" dirty="0"/>
-                      </a:br>
-                      <a:r>
-                        <a:rPr lang="en-US" dirty="0"/>
-                        <a:t>bitmap</a:t>
-                      </a:r>
-                      <a:endParaRPr lang="ru-RU" dirty="0"/>
-                    </a:p>
-                  </a:txBody>
-                  <a:tcPr/>
                 </a:tc>
                 <a:tc>
                   <a:txBody>
@@ -31951,7 +31953,7 @@
           <p:nvPr>
             <p:extLst>
               <p:ext uri="{D42A27DB-BD31-4B8C-83A1-F6EECF244321}">
-                <p14:modId xmlns:p14="http://schemas.microsoft.com/office/powerpoint/2010/main" val="2771803520"/>
+                <p14:modId xmlns:p14="http://schemas.microsoft.com/office/powerpoint/2010/main" val="2830052662"/>
               </p:ext>
             </p:extLst>
           </p:nvPr>
@@ -32065,31 +32067,33 @@
                       <a:endParaRPr lang="ru-RU" dirty="0"/>
                     </a:p>
                   </a:txBody>
-                  <a:tcPr/>
-                </a:tc>
-                <a:tc>
-                  <a:txBody>
-                    <a:bodyPr/>
-                    <a:lstStyle/>
-                    <a:p>
-                      <a:r>
-                        <a:rPr lang="en-US" dirty="0" err="1"/>
-                        <a:t>Inode</a:t>
-                      </a:r>
-                      <a:br>
-                        <a:rPr lang="en-US" dirty="0"/>
-                      </a:br>
-                      <a:r>
-                        <a:rPr lang="en-US" dirty="0"/>
-                        <a:t>bitmap</a:t>
-                      </a:r>
-                      <a:endParaRPr lang="ru-RU" dirty="0"/>
-                    </a:p>
-                  </a:txBody>
                   <a:tcPr>
                     <a:solidFill>
                       <a:srgbClr val="00B050"/>
                     </a:solidFill>
+                  </a:tcPr>
+                </a:tc>
+                <a:tc>
+                  <a:txBody>
+                    <a:bodyPr/>
+                    <a:lstStyle/>
+                    <a:p>
+                      <a:r>
+                        <a:rPr lang="en-US" dirty="0" err="1"/>
+                        <a:t>Inode</a:t>
+                      </a:r>
+                      <a:br>
+                        <a:rPr lang="en-US" dirty="0"/>
+                      </a:br>
+                      <a:r>
+                        <a:rPr lang="en-US" dirty="0"/>
+                        <a:t>bitmap</a:t>
+                      </a:r>
+                      <a:endParaRPr lang="ru-RU" dirty="0"/>
+                    </a:p>
+                  </a:txBody>
+                  <a:tcPr>
+                    <a:noFill/>
                   </a:tcPr>
                 </a:tc>
                 <a:tc>

</xml_diff>